<commit_message>
[Maps] add functionality for 'Delete key from map'
Signed-off-by: kumuda <kumudapriya.sanka@gmail.com>
</commit_message>
<xml_diff>
--- a/Learning Go.pptx
+++ b/Learning Go.pptx
@@ -107,6 +107,11 @@
       </a:defRPr>
     </a:lvl9pPr>
   </p:defaultTextStyle>
+  <p:extLst>
+    <p:ext uri="{EFAFB233-063F-42B5-8137-9DF3F51BA10A}">
+      <p15:sldGuideLst xmlns:p15="http://schemas.microsoft.com/office/powerpoint/2012/main"/>
+    </p:ext>
+  </p:extLst>
 </p:presentation>
 </file>
 
@@ -115,18 +120,18 @@
   <pc:docChgLst>
     <pc:chgData name="kumuda sanka" userId="502332cbc185c6bc" providerId="LiveId" clId="{B04A1E01-6716-402A-93AD-5FC0A18DEF1D}"/>
     <pc:docChg chg="undo custSel addSld modSld">
-      <pc:chgData name="kumuda sanka" userId="502332cbc185c6bc" providerId="LiveId" clId="{B04A1E01-6716-402A-93AD-5FC0A18DEF1D}" dt="2022-08-08T07:37:48.078" v="157" actId="20577"/>
+      <pc:chgData name="kumuda sanka" userId="502332cbc185c6bc" providerId="LiveId" clId="{B04A1E01-6716-402A-93AD-5FC0A18DEF1D}" dt="2022-08-14T12:20:29.789" v="228" actId="20577"/>
       <pc:docMkLst>
         <pc:docMk/>
       </pc:docMkLst>
       <pc:sldChg chg="addSp delSp modSp new mod">
-        <pc:chgData name="kumuda sanka" userId="502332cbc185c6bc" providerId="LiveId" clId="{B04A1E01-6716-402A-93AD-5FC0A18DEF1D}" dt="2022-08-08T07:37:48.078" v="157" actId="20577"/>
+        <pc:chgData name="kumuda sanka" userId="502332cbc185c6bc" providerId="LiveId" clId="{B04A1E01-6716-402A-93AD-5FC0A18DEF1D}" dt="2022-08-12T13:25:45.802" v="217" actId="20577"/>
         <pc:sldMkLst>
           <pc:docMk/>
           <pc:sldMk cId="835886926" sldId="257"/>
         </pc:sldMkLst>
         <pc:spChg chg="mod">
-          <ac:chgData name="kumuda sanka" userId="502332cbc185c6bc" providerId="LiveId" clId="{B04A1E01-6716-402A-93AD-5FC0A18DEF1D}" dt="2022-08-08T07:37:48.078" v="157" actId="20577"/>
+          <ac:chgData name="kumuda sanka" userId="502332cbc185c6bc" providerId="LiveId" clId="{B04A1E01-6716-402A-93AD-5FC0A18DEF1D}" dt="2022-08-12T13:25:45.802" v="217" actId="20577"/>
           <ac:spMkLst>
             <pc:docMk/>
             <pc:sldMk cId="835886926" sldId="257"/>
@@ -189,12 +194,36 @@
           </ac:spMkLst>
         </pc:spChg>
       </pc:sldChg>
-      <pc:sldChg chg="new">
-        <pc:chgData name="kumuda sanka" userId="502332cbc185c6bc" providerId="LiveId" clId="{B04A1E01-6716-402A-93AD-5FC0A18DEF1D}" dt="2022-08-08T07:25:19.832" v="126" actId="680"/>
+      <pc:sldChg chg="addSp delSp modSp new mod">
+        <pc:chgData name="kumuda sanka" userId="502332cbc185c6bc" providerId="LiveId" clId="{B04A1E01-6716-402A-93AD-5FC0A18DEF1D}" dt="2022-08-14T12:20:29.789" v="228" actId="20577"/>
         <pc:sldMkLst>
           <pc:docMk/>
           <pc:sldMk cId="1030408984" sldId="259"/>
         </pc:sldMkLst>
+        <pc:spChg chg="mod">
+          <ac:chgData name="kumuda sanka" userId="502332cbc185c6bc" providerId="LiveId" clId="{B04A1E01-6716-402A-93AD-5FC0A18DEF1D}" dt="2022-08-14T12:19:36.273" v="218"/>
+          <ac:spMkLst>
+            <pc:docMk/>
+            <pc:sldMk cId="1030408984" sldId="259"/>
+            <ac:spMk id="2" creationId="{B5E51751-C471-0C99-53C6-3EE6F7EC05D2}"/>
+          </ac:spMkLst>
+        </pc:spChg>
+        <pc:spChg chg="del">
+          <ac:chgData name="kumuda sanka" userId="502332cbc185c6bc" providerId="LiveId" clId="{B04A1E01-6716-402A-93AD-5FC0A18DEF1D}" dt="2022-08-14T12:19:48.980" v="219"/>
+          <ac:spMkLst>
+            <pc:docMk/>
+            <pc:sldMk cId="1030408984" sldId="259"/>
+            <ac:spMk id="3" creationId="{59AE4964-6479-8A6C-A17A-8E2848C7A1DC}"/>
+          </ac:spMkLst>
+        </pc:spChg>
+        <pc:spChg chg="add mod">
+          <ac:chgData name="kumuda sanka" userId="502332cbc185c6bc" providerId="LiveId" clId="{B04A1E01-6716-402A-93AD-5FC0A18DEF1D}" dt="2022-08-14T12:20:29.789" v="228" actId="20577"/>
+          <ac:spMkLst>
+            <pc:docMk/>
+            <pc:sldMk cId="1030408984" sldId="259"/>
+            <ac:spMk id="4" creationId="{9FAED548-85D5-43DF-1297-1516F7D5D67F}"/>
+          </ac:spMkLst>
+        </pc:spChg>
       </pc:sldChg>
     </pc:docChg>
   </pc:docChgLst>
@@ -3541,7 +3570,7 @@
           <a:bodyPr/>
           <a:lstStyle/>
           <a:p>
-            <a:endParaRPr lang="en-IN"/>
+            <a:endParaRPr lang="en-IN" dirty="0"/>
           </a:p>
         </p:txBody>
       </p:sp>
@@ -3563,7 +3592,9 @@
         </p:nvSpPr>
         <p:spPr/>
         <p:txBody>
-          <a:bodyPr/>
+          <a:bodyPr>
+            <a:normAutofit fontScale="77500" lnSpcReduction="20000"/>
+          </a:bodyPr>
           <a:lstStyle/>
           <a:p>
             <a:r>
@@ -3606,6 +3637,15 @@
               <a:rPr lang="en-US" dirty="0"/>
               <a:t>go test</a:t>
             </a:r>
+          </a:p>
+          <a:p>
+            <a:r>
+              <a:rPr lang="en-IN" dirty="0">
+                <a:effectLst/>
+              </a:rPr>
+              <a:t>go test -v</a:t>
+            </a:r>
+            <a:endParaRPr lang="en-US" dirty="0"/>
           </a:p>
           <a:p>
             <a:r>
@@ -3704,22 +3744,51 @@
               <a:rPr lang="en-US" dirty="0">
                 <a:latin typeface="inherit"/>
               </a:rPr>
-              <a:t>http://localhost:8000</a:t>
-            </a:r>
-            <a:r>
-              <a:rPr lang="en-US">
-                <a:latin typeface="inherit"/>
-              </a:rPr>
-              <a:t>/pkg/</a:t>
-            </a:r>
-            <a:endParaRPr lang="en-US" dirty="0">
-              <a:latin typeface="inherit"/>
-            </a:endParaRPr>
+              <a:t>http://localhost:8000/pkg/</a:t>
+            </a:r>
+          </a:p>
+          <a:p>
+            <a:r>
+              <a:rPr lang="en-IN" dirty="0">
+                <a:effectLst/>
+              </a:rPr>
+              <a:t>go test -bench=".“</a:t>
+            </a:r>
           </a:p>
           <a:p>
             <a:r>
               <a:rPr lang="en-US" dirty="0"/>
-              <a:t>c</a:t>
+              <a:t>go test –cover</a:t>
+            </a:r>
+          </a:p>
+          <a:p>
+            <a:r>
+              <a:rPr lang="en-US" dirty="0">
+                <a:effectLst/>
+              </a:rPr>
+              <a:t>go test -run </a:t>
+            </a:r>
+            <a:r>
+              <a:rPr lang="en-US" dirty="0" err="1">
+                <a:effectLst/>
+              </a:rPr>
+              <a:t>TestArea</a:t>
+            </a:r>
+            <a:r>
+              <a:rPr lang="en-US" dirty="0">
+                <a:effectLst/>
+              </a:rPr>
+              <a:t>/Rectangle</a:t>
+            </a:r>
+          </a:p>
+          <a:p>
+            <a:r>
+              <a:rPr lang="en-US" dirty="0" err="1"/>
+              <a:t>errcheck</a:t>
+            </a:r>
+            <a:r>
+              <a:rPr lang="en-US" dirty="0"/>
+              <a:t> .</a:t>
             </a:r>
           </a:p>
           <a:p>
@@ -4497,32 +4566,424 @@
           <a:bodyPr/>
           <a:lstStyle/>
           <a:p>
-            <a:endParaRPr lang="en-IN"/>
-          </a:p>
-        </p:txBody>
-      </p:sp>
-      <p:sp>
-        <p:nvSpPr>
-          <p:cNvPr id="3" name="Content Placeholder 2">
-            <a:extLst>
-              <a:ext uri="{FF2B5EF4-FFF2-40B4-BE49-F238E27FC236}">
-                <a16:creationId xmlns:a16="http://schemas.microsoft.com/office/drawing/2014/main" id="{59AE4964-6479-8A6C-A17A-8E2848C7A1DC}"/>
-              </a:ext>
-            </a:extLst>
-          </p:cNvPr>
-          <p:cNvSpPr>
-            <a:spLocks noGrp="1"/>
+            <a:r>
+              <a:rPr lang="en-US" dirty="0">
+                <a:effectLst/>
+              </a:rPr>
+              <a:t>A map value is a pointer to a </a:t>
+            </a:r>
+            <a:r>
+              <a:rPr lang="en-US" dirty="0" err="1">
+                <a:effectLst/>
+              </a:rPr>
+              <a:t>runtime.hmap</a:t>
+            </a:r>
+            <a:r>
+              <a:rPr lang="en-US" dirty="0">
+                <a:effectLst/>
+              </a:rPr>
+              <a:t> structure</a:t>
+            </a:r>
+            <a:endParaRPr lang="en-IN" dirty="0"/>
+          </a:p>
+        </p:txBody>
+      </p:sp>
+      <p:sp>
+        <p:nvSpPr>
+          <p:cNvPr id="4" name="Rectangle 1">
+            <a:extLst>
+              <a:ext uri="{FF2B5EF4-FFF2-40B4-BE49-F238E27FC236}">
+                <a16:creationId xmlns:a16="http://schemas.microsoft.com/office/drawing/2014/main" id="{9FAED548-85D5-43DF-1297-1516F7D5D67F}"/>
+              </a:ext>
+            </a:extLst>
+          </p:cNvPr>
+          <p:cNvSpPr>
+            <a:spLocks noGrp="1" noChangeArrowheads="1"/>
           </p:cNvSpPr>
           <p:nvPr>
             <p:ph idx="1"/>
           </p:nvPr>
         </p:nvSpPr>
-        <p:spPr/>
-        <p:txBody>
-          <a:bodyPr/>
-          <a:lstStyle/>
-          <a:p>
-            <a:endParaRPr lang="en-IN"/>
+        <p:spPr bwMode="auto">
+          <a:xfrm>
+            <a:off x="838200" y="2724023"/>
+            <a:ext cx="10472482" cy="2554545"/>
+          </a:xfrm>
+          <a:prstGeom prst="rect">
+            <a:avLst/>
+          </a:prstGeom>
+          <a:noFill/>
+          <a:ln>
+            <a:noFill/>
+          </a:ln>
+          <a:effectLst/>
+          <a:extLst>
+            <a:ext uri="{909E8E84-426E-40DD-AFC4-6F175D3DCCD1}">
+              <a14:hiddenFill xmlns:a14="http://schemas.microsoft.com/office/drawing/2010/main">
+                <a:solidFill>
+                  <a:schemeClr val="accent1"/>
+                </a:solidFill>
+              </a14:hiddenFill>
+            </a:ext>
+            <a:ext uri="{91240B29-F687-4F45-9708-019B960494DF}">
+              <a14:hiddenLine xmlns:a14="http://schemas.microsoft.com/office/drawing/2010/main" w="9525">
+                <a:solidFill>
+                  <a:schemeClr val="tx1"/>
+                </a:solidFill>
+                <a:miter lim="800000"/>
+                <a:headEnd/>
+                <a:tailEnd/>
+              </a14:hiddenLine>
+            </a:ext>
+            <a:ext uri="{AF507438-7753-43E0-B8FC-AC1667EBCBE1}">
+              <a14:hiddenEffects xmlns:a14="http://schemas.microsoft.com/office/drawing/2010/main">
+                <a:effectLst>
+                  <a:outerShdw dist="35921" dir="2700000" algn="ctr" rotWithShape="0">
+                    <a:schemeClr val="bg2"/>
+                  </a:outerShdw>
+                </a:effectLst>
+              </a14:hiddenEffects>
+            </a:ext>
+          </a:extLst>
+        </p:spPr>
+        <p:txBody>
+          <a:bodyPr vert="horz" wrap="none" lIns="91440" tIns="45720" rIns="91440" bIns="45720" numCol="1" anchor="ctr" anchorCtr="0" compatLnSpc="1">
+            <a:prstTxWarp prst="textNoShape">
+              <a:avLst/>
+            </a:prstTxWarp>
+            <a:spAutoFit/>
+          </a:bodyPr>
+          <a:lstStyle/>
+          <a:p>
+            <a:pPr marL="0" marR="0" lvl="0" indent="0" algn="l" defTabSz="914400" rtl="0" eaLnBrk="0" fontAlgn="base" latinLnBrk="0" hangingPunct="0">
+              <a:lnSpc>
+                <a:spcPct val="100000"/>
+              </a:lnSpc>
+              <a:spcBef>
+                <a:spcPct val="0"/>
+              </a:spcBef>
+              <a:spcAft>
+                <a:spcPct val="0"/>
+              </a:spcAft>
+              <a:buClrTx/>
+              <a:buSzTx/>
+              <a:buFontTx/>
+              <a:buNone/>
+              <a:tabLst/>
+            </a:pPr>
+            <a:r>
+              <a:rPr kumimoji="0" lang="en-US" altLang="en-US" sz="2000" b="0" i="0" u="none" strike="noStrike" cap="none" normalizeH="0" baseline="0" dirty="0">
+                <a:ln>
+                  <a:noFill/>
+                </a:ln>
+                <a:solidFill>
+                  <a:schemeClr val="tx1"/>
+                </a:solidFill>
+                <a:effectLst/>
+                <a:latin typeface="Arial" panose="020B0604020202020204" pitchFamily="34" charset="0"/>
+              </a:rPr>
+              <a:t>So when you pass a map to a function/method, you are indeed copying it, </a:t>
+            </a:r>
+          </a:p>
+          <a:p>
+            <a:pPr marL="0" marR="0" lvl="0" indent="0" algn="l" defTabSz="914400" rtl="0" eaLnBrk="0" fontAlgn="base" latinLnBrk="0" hangingPunct="0">
+              <a:lnSpc>
+                <a:spcPct val="100000"/>
+              </a:lnSpc>
+              <a:spcBef>
+                <a:spcPct val="0"/>
+              </a:spcBef>
+              <a:spcAft>
+                <a:spcPct val="0"/>
+              </a:spcAft>
+              <a:buClrTx/>
+              <a:buSzTx/>
+              <a:buFontTx/>
+              <a:buNone/>
+              <a:tabLst/>
+            </a:pPr>
+            <a:r>
+              <a:rPr kumimoji="0" lang="en-US" altLang="en-US" sz="2000" b="0" i="0" u="none" strike="noStrike" cap="none" normalizeH="0" baseline="0" dirty="0">
+                <a:ln>
+                  <a:noFill/>
+                </a:ln>
+                <a:solidFill>
+                  <a:schemeClr val="tx1"/>
+                </a:solidFill>
+                <a:effectLst/>
+                <a:latin typeface="Arial" panose="020B0604020202020204" pitchFamily="34" charset="0"/>
+              </a:rPr>
+              <a:t>but just the pointer part, not the underlying data structure that contains the data.</a:t>
+            </a:r>
+          </a:p>
+          <a:p>
+            <a:pPr marL="0" marR="0" lvl="0" indent="0" algn="l" defTabSz="914400" rtl="0" eaLnBrk="0" fontAlgn="base" latinLnBrk="0" hangingPunct="0">
+              <a:lnSpc>
+                <a:spcPct val="100000"/>
+              </a:lnSpc>
+              <a:spcBef>
+                <a:spcPct val="0"/>
+              </a:spcBef>
+              <a:spcAft>
+                <a:spcPct val="0"/>
+              </a:spcAft>
+              <a:buClrTx/>
+              <a:buSzTx/>
+              <a:buFontTx/>
+              <a:buNone/>
+              <a:tabLst/>
+            </a:pPr>
+            <a:endParaRPr kumimoji="0" lang="en-US" altLang="en-US" sz="2000" b="0" i="0" u="none" strike="noStrike" cap="none" normalizeH="0" baseline="0" dirty="0">
+              <a:ln>
+                <a:noFill/>
+              </a:ln>
+              <a:solidFill>
+                <a:schemeClr val="tx1"/>
+              </a:solidFill>
+              <a:effectLst/>
+              <a:latin typeface="Arial" panose="020B0604020202020204" pitchFamily="34" charset="0"/>
+            </a:endParaRPr>
+          </a:p>
+          <a:p>
+            <a:pPr marL="0" marR="0" lvl="0" indent="0" algn="l" defTabSz="914400" rtl="0" eaLnBrk="0" fontAlgn="base" latinLnBrk="0" hangingPunct="0">
+              <a:lnSpc>
+                <a:spcPct val="100000"/>
+              </a:lnSpc>
+              <a:spcBef>
+                <a:spcPct val="0"/>
+              </a:spcBef>
+              <a:spcAft>
+                <a:spcPct val="0"/>
+              </a:spcAft>
+              <a:buClrTx/>
+              <a:buSzTx/>
+              <a:buFontTx/>
+              <a:buNone/>
+              <a:tabLst/>
+            </a:pPr>
+            <a:endParaRPr lang="en-US" altLang="en-US" sz="2000" dirty="0">
+              <a:latin typeface="Arial" panose="020B0604020202020204" pitchFamily="34" charset="0"/>
+            </a:endParaRPr>
+          </a:p>
+          <a:p>
+            <a:pPr marL="0" marR="0" lvl="0" indent="0" algn="l" defTabSz="914400" rtl="0" eaLnBrk="0" fontAlgn="base" latinLnBrk="0" hangingPunct="0">
+              <a:lnSpc>
+                <a:spcPct val="100000"/>
+              </a:lnSpc>
+              <a:spcBef>
+                <a:spcPct val="0"/>
+              </a:spcBef>
+              <a:spcAft>
+                <a:spcPct val="0"/>
+              </a:spcAft>
+              <a:buClrTx/>
+              <a:buSzTx/>
+              <a:buFontTx/>
+              <a:buNone/>
+              <a:tabLst/>
+            </a:pPr>
+            <a:r>
+              <a:rPr kumimoji="0" lang="en-US" altLang="en-US" sz="2000" b="0" i="0" u="none" strike="noStrike" cap="none" normalizeH="0" baseline="0" dirty="0">
+                <a:ln>
+                  <a:noFill/>
+                </a:ln>
+                <a:solidFill>
+                  <a:schemeClr val="tx1"/>
+                </a:solidFill>
+                <a:effectLst/>
+                <a:latin typeface="Arial" panose="020B0604020202020204" pitchFamily="34" charset="0"/>
+              </a:rPr>
+              <a:t>A gotcha with maps is that they can be a </a:t>
+            </a:r>
+            <a:r>
+              <a:rPr kumimoji="0" lang="en-US" altLang="en-US" sz="2000" b="0" i="0" u="none" strike="noStrike" cap="none" normalizeH="0" baseline="0" dirty="0">
+                <a:ln>
+                  <a:noFill/>
+                </a:ln>
+                <a:solidFill>
+                  <a:schemeClr val="tx1"/>
+                </a:solidFill>
+                <a:effectLst/>
+                <a:latin typeface="Arial Unicode MS"/>
+              </a:rPr>
+              <a:t>nil</a:t>
+            </a:r>
+            <a:r>
+              <a:rPr kumimoji="0" lang="en-US" altLang="en-US" sz="2000" b="0" i="0" u="none" strike="noStrike" cap="none" normalizeH="0" baseline="0" dirty="0">
+                <a:ln>
+                  <a:noFill/>
+                </a:ln>
+                <a:solidFill>
+                  <a:schemeClr val="tx1"/>
+                </a:solidFill>
+                <a:effectLst/>
+              </a:rPr>
+              <a:t> value. </a:t>
+            </a:r>
+          </a:p>
+          <a:p>
+            <a:pPr marL="0" marR="0" lvl="0" indent="0" algn="l" defTabSz="914400" rtl="0" eaLnBrk="0" fontAlgn="base" latinLnBrk="0" hangingPunct="0">
+              <a:lnSpc>
+                <a:spcPct val="100000"/>
+              </a:lnSpc>
+              <a:spcBef>
+                <a:spcPct val="0"/>
+              </a:spcBef>
+              <a:spcAft>
+                <a:spcPct val="0"/>
+              </a:spcAft>
+              <a:buClrTx/>
+              <a:buSzTx/>
+              <a:buFontTx/>
+              <a:buNone/>
+              <a:tabLst/>
+            </a:pPr>
+            <a:endParaRPr kumimoji="0" lang="en-US" altLang="en-US" sz="2000" b="0" i="0" u="none" strike="noStrike" cap="none" normalizeH="0" baseline="0">
+              <a:ln>
+                <a:noFill/>
+              </a:ln>
+              <a:solidFill>
+                <a:schemeClr val="tx1"/>
+              </a:solidFill>
+              <a:effectLst/>
+            </a:endParaRPr>
+          </a:p>
+          <a:p>
+            <a:pPr marL="0" marR="0" lvl="0" indent="0" algn="l" defTabSz="914400" rtl="0" eaLnBrk="0" fontAlgn="base" latinLnBrk="0" hangingPunct="0">
+              <a:lnSpc>
+                <a:spcPct val="100000"/>
+              </a:lnSpc>
+              <a:spcBef>
+                <a:spcPct val="0"/>
+              </a:spcBef>
+              <a:spcAft>
+                <a:spcPct val="0"/>
+              </a:spcAft>
+              <a:buClrTx/>
+              <a:buSzTx/>
+              <a:buFontTx/>
+              <a:buNone/>
+              <a:tabLst/>
+            </a:pPr>
+            <a:r>
+              <a:rPr kumimoji="0" lang="en-US" altLang="en-US" sz="2000" b="0" i="0" u="none" strike="noStrike" cap="none" normalizeH="0" baseline="0">
+                <a:ln>
+                  <a:noFill/>
+                </a:ln>
+                <a:solidFill>
+                  <a:schemeClr val="tx1"/>
+                </a:solidFill>
+                <a:effectLst/>
+              </a:rPr>
+              <a:t>A </a:t>
+            </a:r>
+            <a:r>
+              <a:rPr kumimoji="0" lang="en-US" altLang="en-US" sz="2000" b="0" i="0" u="none" strike="noStrike" cap="none" normalizeH="0" baseline="0" dirty="0">
+                <a:ln>
+                  <a:noFill/>
+                </a:ln>
+                <a:solidFill>
+                  <a:schemeClr val="tx1"/>
+                </a:solidFill>
+                <a:effectLst/>
+                <a:latin typeface="Arial Unicode MS"/>
+              </a:rPr>
+              <a:t>nil</a:t>
+            </a:r>
+            <a:r>
+              <a:rPr kumimoji="0" lang="en-US" altLang="en-US" sz="2000" b="0" i="0" u="none" strike="noStrike" cap="none" normalizeH="0" baseline="0" dirty="0">
+                <a:ln>
+                  <a:noFill/>
+                </a:ln>
+                <a:solidFill>
+                  <a:schemeClr val="tx1"/>
+                </a:solidFill>
+                <a:effectLst/>
+              </a:rPr>
+              <a:t> map behaves like an empty map when reading, </a:t>
+            </a:r>
+          </a:p>
+          <a:p>
+            <a:pPr marL="0" marR="0" lvl="0" indent="0" algn="l" defTabSz="914400" rtl="0" eaLnBrk="0" fontAlgn="base" latinLnBrk="0" hangingPunct="0">
+              <a:lnSpc>
+                <a:spcPct val="100000"/>
+              </a:lnSpc>
+              <a:spcBef>
+                <a:spcPct val="0"/>
+              </a:spcBef>
+              <a:spcAft>
+                <a:spcPct val="0"/>
+              </a:spcAft>
+              <a:buClrTx/>
+              <a:buSzTx/>
+              <a:buFontTx/>
+              <a:buNone/>
+              <a:tabLst/>
+            </a:pPr>
+            <a:r>
+              <a:rPr kumimoji="0" lang="en-US" altLang="en-US" sz="2000" b="0" i="0" u="none" strike="noStrike" cap="none" normalizeH="0" baseline="0" dirty="0">
+                <a:ln>
+                  <a:noFill/>
+                </a:ln>
+                <a:solidFill>
+                  <a:schemeClr val="tx1"/>
+                </a:solidFill>
+                <a:effectLst/>
+              </a:rPr>
+              <a:t>but attempts to write to a </a:t>
+            </a:r>
+            <a:r>
+              <a:rPr kumimoji="0" lang="en-US" altLang="en-US" sz="2000" b="0" i="0" u="none" strike="noStrike" cap="none" normalizeH="0" baseline="0" dirty="0">
+                <a:ln>
+                  <a:noFill/>
+                </a:ln>
+                <a:solidFill>
+                  <a:schemeClr val="tx1"/>
+                </a:solidFill>
+                <a:effectLst/>
+                <a:latin typeface="Arial Unicode MS"/>
+              </a:rPr>
+              <a:t>nil</a:t>
+            </a:r>
+            <a:r>
+              <a:rPr kumimoji="0" lang="en-US" altLang="en-US" sz="2000" b="0" i="0" u="none" strike="noStrike" cap="none" normalizeH="0" baseline="0" dirty="0">
+                <a:ln>
+                  <a:noFill/>
+                </a:ln>
+                <a:solidFill>
+                  <a:schemeClr val="tx1"/>
+                </a:solidFill>
+                <a:effectLst/>
+              </a:rPr>
+              <a:t> map will cause a runtime panic. You can read more about maps </a:t>
+            </a:r>
+            <a:r>
+              <a:rPr kumimoji="0" lang="en-US" altLang="en-US" sz="2000" b="0" i="0" u="none" strike="noStrike" cap="none" normalizeH="0" baseline="0" dirty="0">
+                <a:ln>
+                  <a:noFill/>
+                </a:ln>
+                <a:solidFill>
+                  <a:schemeClr val="tx1"/>
+                </a:solidFill>
+                <a:effectLst/>
+                <a:latin typeface="Arial" panose="020B0604020202020204" pitchFamily="34" charset="0"/>
+                <a:hlinkClick r:id="rId2"/>
+              </a:rPr>
+              <a:t>here</a:t>
+            </a:r>
+            <a:r>
+              <a:rPr kumimoji="0" lang="en-US" altLang="en-US" sz="2000" b="0" i="0" u="none" strike="noStrike" cap="none" normalizeH="0" baseline="0" dirty="0">
+                <a:ln>
+                  <a:noFill/>
+                </a:ln>
+                <a:solidFill>
+                  <a:schemeClr val="tx1"/>
+                </a:solidFill>
+                <a:effectLst/>
+                <a:latin typeface="Arial" panose="020B0604020202020204" pitchFamily="34" charset="0"/>
+              </a:rPr>
+              <a:t>.</a:t>
+            </a:r>
           </a:p>
         </p:txBody>
       </p:sp>

</xml_diff>